<commit_message>
remove the UNIQUE for Flavor, Dish, Category2, Category1, DishchoosePopinfo, DishChooseSubitem
</commit_message>
<xml_diff>
--- a/doc/introduce.pptx
+++ b/doc/introduce.pptx
@@ -6,6 +6,7 @@
   </p:sldMasterIdLst>
   <p:sldIdLst>
     <p:sldId id="256" r:id="rId2"/>
+    <p:sldId id="257" r:id="rId3"/>
   </p:sldIdLst>
   <p:sldSz cx="9144000" cy="6858000" type="screen4x3"/>
   <p:notesSz cx="6858000" cy="9144000"/>
@@ -289,7 +290,7 @@
             <a:fld id="{530820CF-B880-4189-942D-D702A7CBA730}" type="datetimeFigureOut">
               <a:rPr lang="zh-CN" altLang="en-US" smtClean="0"/>
               <a:pPr/>
-              <a:t>2017/8/7</a:t>
+              <a:t>2017/11/25</a:t>
             </a:fld>
             <a:endParaRPr lang="zh-CN" altLang="en-US"/>
           </a:p>
@@ -456,7 +457,7 @@
             <a:fld id="{530820CF-B880-4189-942D-D702A7CBA730}" type="datetimeFigureOut">
               <a:rPr lang="zh-CN" altLang="en-US" smtClean="0"/>
               <a:pPr/>
-              <a:t>2017/8/7</a:t>
+              <a:t>2017/11/25</a:t>
             </a:fld>
             <a:endParaRPr lang="zh-CN" altLang="en-US"/>
           </a:p>
@@ -633,7 +634,7 @@
             <a:fld id="{530820CF-B880-4189-942D-D702A7CBA730}" type="datetimeFigureOut">
               <a:rPr lang="zh-CN" altLang="en-US" smtClean="0"/>
               <a:pPr/>
-              <a:t>2017/8/7</a:t>
+              <a:t>2017/11/25</a:t>
             </a:fld>
             <a:endParaRPr lang="zh-CN" altLang="en-US"/>
           </a:p>
@@ -800,7 +801,7 @@
             <a:fld id="{530820CF-B880-4189-942D-D702A7CBA730}" type="datetimeFigureOut">
               <a:rPr lang="zh-CN" altLang="en-US" smtClean="0"/>
               <a:pPr/>
-              <a:t>2017/8/7</a:t>
+              <a:t>2017/11/25</a:t>
             </a:fld>
             <a:endParaRPr lang="zh-CN" altLang="en-US"/>
           </a:p>
@@ -1043,7 +1044,7 @@
             <a:fld id="{530820CF-B880-4189-942D-D702A7CBA730}" type="datetimeFigureOut">
               <a:rPr lang="zh-CN" altLang="en-US" smtClean="0"/>
               <a:pPr/>
-              <a:t>2017/8/7</a:t>
+              <a:t>2017/11/25</a:t>
             </a:fld>
             <a:endParaRPr lang="zh-CN" altLang="en-US"/>
           </a:p>
@@ -1328,7 +1329,7 @@
             <a:fld id="{530820CF-B880-4189-942D-D702A7CBA730}" type="datetimeFigureOut">
               <a:rPr lang="zh-CN" altLang="en-US" smtClean="0"/>
               <a:pPr/>
-              <a:t>2017/8/7</a:t>
+              <a:t>2017/11/25</a:t>
             </a:fld>
             <a:endParaRPr lang="zh-CN" altLang="en-US"/>
           </a:p>
@@ -1747,7 +1748,7 @@
             <a:fld id="{530820CF-B880-4189-942D-D702A7CBA730}" type="datetimeFigureOut">
               <a:rPr lang="zh-CN" altLang="en-US" smtClean="0"/>
               <a:pPr/>
-              <a:t>2017/8/7</a:t>
+              <a:t>2017/11/25</a:t>
             </a:fld>
             <a:endParaRPr lang="zh-CN" altLang="en-US"/>
           </a:p>
@@ -1862,7 +1863,7 @@
             <a:fld id="{530820CF-B880-4189-942D-D702A7CBA730}" type="datetimeFigureOut">
               <a:rPr lang="zh-CN" altLang="en-US" smtClean="0"/>
               <a:pPr/>
-              <a:t>2017/8/7</a:t>
+              <a:t>2017/11/25</a:t>
             </a:fld>
             <a:endParaRPr lang="zh-CN" altLang="en-US"/>
           </a:p>
@@ -1954,7 +1955,7 @@
             <a:fld id="{530820CF-B880-4189-942D-D702A7CBA730}" type="datetimeFigureOut">
               <a:rPr lang="zh-CN" altLang="en-US" smtClean="0"/>
               <a:pPr/>
-              <a:t>2017/8/7</a:t>
+              <a:t>2017/11/25</a:t>
             </a:fld>
             <a:endParaRPr lang="zh-CN" altLang="en-US"/>
           </a:p>
@@ -2228,7 +2229,7 @@
             <a:fld id="{530820CF-B880-4189-942D-D702A7CBA730}" type="datetimeFigureOut">
               <a:rPr lang="zh-CN" altLang="en-US" smtClean="0"/>
               <a:pPr/>
-              <a:t>2017/8/7</a:t>
+              <a:t>2017/11/25</a:t>
             </a:fld>
             <a:endParaRPr lang="zh-CN" altLang="en-US"/>
           </a:p>
@@ -2478,7 +2479,7 @@
             <a:fld id="{530820CF-B880-4189-942D-D702A7CBA730}" type="datetimeFigureOut">
               <a:rPr lang="zh-CN" altLang="en-US" smtClean="0"/>
               <a:pPr/>
-              <a:t>2017/8/7</a:t>
+              <a:t>2017/11/25</a:t>
             </a:fld>
             <a:endParaRPr lang="zh-CN" altLang="en-US"/>
           </a:p>
@@ -2688,7 +2689,7 @@
             <a:fld id="{530820CF-B880-4189-942D-D702A7CBA730}" type="datetimeFigureOut">
               <a:rPr lang="zh-CN" altLang="en-US" smtClean="0"/>
               <a:pPr/>
-              <a:t>2017/8/7</a:t>
+              <a:t>2017/11/25</a:t>
             </a:fld>
             <a:endParaRPr lang="zh-CN" altLang="en-US"/>
           </a:p>
@@ -3059,6 +3060,38 @@
           <a:chExt cx="0" cy="0"/>
         </a:xfrm>
       </p:grpSpPr>
+      <p:pic>
+        <p:nvPicPr>
+          <p:cNvPr id="3" name="Picture 3"/>
+          <p:cNvPicPr>
+            <a:picLocks noChangeAspect="1" noChangeArrowheads="1"/>
+          </p:cNvPicPr>
+          <p:nvPr/>
+        </p:nvPicPr>
+        <p:blipFill>
+          <a:blip r:embed="rId2" cstate="print"/>
+          <a:srcRect/>
+          <a:stretch>
+            <a:fillRect/>
+          </a:stretch>
+        </p:blipFill>
+        <p:spPr bwMode="auto">
+          <a:xfrm>
+            <a:off x="3707904" y="3717032"/>
+            <a:ext cx="5162550" cy="2209800"/>
+          </a:xfrm>
+          <a:prstGeom prst="rect">
+            <a:avLst/>
+          </a:prstGeom>
+          <a:noFill/>
+          <a:ln w="9525">
+            <a:noFill/>
+            <a:miter lim="800000"/>
+            <a:headEnd/>
+            <a:tailEnd/>
+          </a:ln>
+        </p:spPr>
+      </p:pic>
       <p:sp>
         <p:nvSpPr>
           <p:cNvPr id="4" name="TextBox 3"/>
@@ -3067,8 +3100,8 @@
         </p:nvSpPr>
         <p:spPr>
           <a:xfrm>
-            <a:off x="755576" y="548680"/>
-            <a:ext cx="7560840" cy="5293757"/>
+            <a:off x="323528" y="332656"/>
+            <a:ext cx="8208912" cy="3693319"/>
           </a:xfrm>
           <a:prstGeom prst="rect">
             <a:avLst/>
@@ -3083,15 +3116,7 @@
           <a:p>
             <a:r>
               <a:rPr lang="zh-CN" altLang="en-US" dirty="0" smtClean="0"/>
-              <a:t>优势</a:t>
-            </a:r>
-            <a:r>
-              <a:rPr lang="en-US" altLang="zh-CN" dirty="0" smtClean="0"/>
-              <a:t>/</a:t>
-            </a:r>
-            <a:r>
-              <a:rPr lang="zh-CN" altLang="en-US" dirty="0" smtClean="0"/>
-              <a:t>必要性</a:t>
+              <a:t>电子菜单的优势和必要性</a:t>
             </a:r>
             <a:endParaRPr lang="en-US" altLang="zh-CN" dirty="0" smtClean="0"/>
           </a:p>
@@ -3100,65 +3125,69 @@
               <a:buAutoNum type="arabicPeriod"/>
             </a:pPr>
             <a:r>
-              <a:rPr lang="zh-CN" altLang="en-US" sz="2000" dirty="0" smtClean="0"/>
-              <a:t>节约人</a:t>
-            </a:r>
-            <a:r>
-              <a:rPr lang="zh-CN" altLang="en-US" sz="2000" dirty="0" smtClean="0"/>
-              <a:t>工</a:t>
-            </a:r>
-            <a:r>
-              <a:rPr lang="en-US" altLang="zh-CN" sz="2000" dirty="0" smtClean="0"/>
+              <a:rPr lang="zh-CN" altLang="en-US" dirty="0" smtClean="0"/>
+              <a:t>节约人工</a:t>
+            </a:r>
+            <a:r>
+              <a:rPr lang="en-US" altLang="zh-CN" dirty="0" smtClean="0"/>
               <a:t>, </a:t>
             </a:r>
             <a:r>
-              <a:rPr lang="zh-CN" altLang="en-US" sz="2000" dirty="0" smtClean="0"/>
+              <a:rPr lang="zh-CN" altLang="en-US" dirty="0" smtClean="0"/>
               <a:t>服务生不需要等待客人下单</a:t>
             </a:r>
             <a:r>
-              <a:rPr lang="en-US" altLang="zh-CN" sz="2000" dirty="0" smtClean="0"/>
+              <a:rPr lang="en-US" altLang="zh-CN" dirty="0" smtClean="0"/>
               <a:t>, </a:t>
             </a:r>
             <a:r>
-              <a:rPr lang="zh-CN" altLang="en-US" sz="2000" dirty="0" smtClean="0"/>
+              <a:rPr lang="zh-CN" altLang="en-US" dirty="0" smtClean="0"/>
               <a:t>可以在客人点菜的间隙完成别的工作</a:t>
             </a:r>
             <a:r>
-              <a:rPr lang="en-US" altLang="zh-CN" sz="2000" dirty="0" smtClean="0"/>
+              <a:rPr lang="en-US" altLang="zh-CN" dirty="0" smtClean="0"/>
+              <a:t>. </a:t>
+            </a:r>
+            <a:r>
+              <a:rPr lang="zh-CN" altLang="en-US" dirty="0" smtClean="0"/>
+              <a:t>进</a:t>
+            </a:r>
+            <a:r>
+              <a:rPr lang="zh-CN" altLang="en-US" dirty="0" smtClean="0"/>
+              <a:t>而可以降低生产成本</a:t>
+            </a:r>
+            <a:r>
+              <a:rPr lang="en-US" altLang="zh-CN" dirty="0" smtClean="0"/>
+              <a:t>, </a:t>
+            </a:r>
+            <a:r>
+              <a:rPr lang="zh-CN" altLang="en-US" dirty="0" smtClean="0"/>
+              <a:t>提高餐馆竞争力</a:t>
+            </a:r>
+            <a:r>
+              <a:rPr lang="en-US" altLang="zh-CN" dirty="0" smtClean="0"/>
               <a:t>.</a:t>
             </a:r>
-            <a:endParaRPr lang="en-US" altLang="zh-CN" sz="2000" dirty="0" smtClean="0"/>
+            <a:endParaRPr lang="en-US" altLang="zh-CN" dirty="0" smtClean="0"/>
           </a:p>
           <a:p>
             <a:pPr marL="342900" indent="-342900">
               <a:buAutoNum type="arabicPeriod"/>
             </a:pPr>
             <a:r>
-              <a:rPr lang="zh-CN" altLang="en-US" sz="2000" dirty="0" smtClean="0"/>
-              <a:t>多媒</a:t>
-            </a:r>
-            <a:r>
-              <a:rPr lang="zh-CN" altLang="en-US" sz="2000" dirty="0" smtClean="0"/>
-              <a:t>体给</a:t>
-            </a:r>
-            <a:r>
-              <a:rPr lang="zh-CN" altLang="en-US" sz="2000" dirty="0" smtClean="0"/>
-              <a:t>顾</a:t>
-            </a:r>
-            <a:r>
-              <a:rPr lang="zh-CN" altLang="en-US" sz="2000" dirty="0" smtClean="0"/>
-              <a:t>客展示菜单</a:t>
-            </a:r>
-            <a:r>
-              <a:rPr lang="en-US" altLang="zh-CN" sz="2000" dirty="0" smtClean="0"/>
+              <a:rPr lang="zh-CN" altLang="en-US" dirty="0" smtClean="0"/>
+              <a:t>多媒体给顾客展示菜单</a:t>
+            </a:r>
+            <a:r>
+              <a:rPr lang="en-US" altLang="zh-CN" dirty="0" smtClean="0"/>
               <a:t>, </a:t>
             </a:r>
             <a:r>
-              <a:rPr lang="zh-CN" altLang="en-US" sz="2000" dirty="0" smtClean="0"/>
+              <a:rPr lang="zh-CN" altLang="en-US" dirty="0" smtClean="0"/>
               <a:t>更加生动形象</a:t>
             </a:r>
             <a:r>
-              <a:rPr lang="en-US" altLang="zh-CN" sz="2000" dirty="0" smtClean="0"/>
+              <a:rPr lang="en-US" altLang="zh-CN" dirty="0" smtClean="0"/>
               <a:t>. </a:t>
             </a:r>
           </a:p>
@@ -3167,69 +3196,64 @@
               <a:buAutoNum type="arabicPeriod"/>
             </a:pPr>
             <a:r>
-              <a:rPr lang="zh-CN" altLang="en-US" sz="2000" dirty="0" smtClean="0"/>
-              <a:t>提</a:t>
-            </a:r>
-            <a:r>
-              <a:rPr lang="zh-CN" altLang="en-US" sz="2000" dirty="0" smtClean="0"/>
-              <a:t>升餐厅形象</a:t>
-            </a:r>
-            <a:r>
-              <a:rPr lang="en-US" altLang="zh-CN" sz="2000" dirty="0" smtClean="0"/>
+              <a:rPr lang="zh-CN" altLang="en-US" dirty="0" smtClean="0"/>
+              <a:t>提升餐厅服务等级</a:t>
+            </a:r>
+            <a:r>
+              <a:rPr lang="en-US" altLang="zh-CN" dirty="0" smtClean="0"/>
               <a:t>, </a:t>
             </a:r>
             <a:r>
-              <a:rPr lang="zh-CN" altLang="en-US" sz="2000" dirty="0" smtClean="0"/>
-              <a:t>能让顾客感觉餐厅配置比其他竞争者更加现代化智能化</a:t>
-            </a:r>
-            <a:r>
-              <a:rPr lang="en-US" altLang="zh-CN" sz="2000" dirty="0" smtClean="0"/>
+              <a:rPr lang="zh-CN" altLang="en-US" dirty="0" smtClean="0"/>
+              <a:t>使顾客感觉餐厅配置比其他竞争者更加现代化智能化</a:t>
+            </a:r>
+            <a:r>
+              <a:rPr lang="en-US" altLang="zh-CN" dirty="0" smtClean="0"/>
               <a:t>.</a:t>
             </a:r>
-            <a:endParaRPr lang="en-US" altLang="zh-CN" sz="2000" dirty="0" smtClean="0"/>
           </a:p>
           <a:p>
             <a:pPr marL="342900" indent="-342900">
               <a:buAutoNum type="arabicPeriod"/>
             </a:pPr>
             <a:r>
-              <a:rPr lang="zh-CN" altLang="en-US" sz="2000" dirty="0" smtClean="0"/>
+              <a:rPr lang="zh-CN" altLang="en-US" dirty="0" smtClean="0"/>
               <a:t>动态调整价格</a:t>
             </a:r>
             <a:r>
-              <a:rPr lang="en-US" altLang="zh-CN" sz="2000" dirty="0" smtClean="0"/>
+              <a:rPr lang="en-US" altLang="zh-CN" dirty="0" smtClean="0"/>
               <a:t>, </a:t>
             </a:r>
             <a:r>
-              <a:rPr lang="zh-CN" altLang="en-US" sz="2000" dirty="0" smtClean="0"/>
+              <a:rPr lang="zh-CN" altLang="en-US" dirty="0" smtClean="0"/>
               <a:t>不必要显示</a:t>
             </a:r>
             <a:r>
-              <a:rPr lang="en-US" altLang="zh-CN" sz="2000" dirty="0" smtClean="0"/>
+              <a:rPr lang="en-US" altLang="zh-CN" dirty="0" smtClean="0"/>
               <a:t>”</a:t>
             </a:r>
             <a:r>
-              <a:rPr lang="zh-CN" altLang="en-US" sz="2000" dirty="0" smtClean="0"/>
+              <a:rPr lang="zh-CN" altLang="en-US" dirty="0" smtClean="0"/>
               <a:t>时价</a:t>
             </a:r>
             <a:r>
-              <a:rPr lang="en-US" altLang="zh-CN" sz="2000" dirty="0" smtClean="0"/>
+              <a:rPr lang="en-US" altLang="zh-CN" dirty="0" smtClean="0"/>
               <a:t>”</a:t>
             </a:r>
             <a:r>
-              <a:rPr lang="zh-CN" altLang="en-US" sz="2000" dirty="0" smtClean="0"/>
+              <a:rPr lang="zh-CN" altLang="en-US" dirty="0" smtClean="0"/>
               <a:t>之类的字眼</a:t>
             </a:r>
             <a:r>
-              <a:rPr lang="en-US" altLang="zh-CN" sz="2000" dirty="0" smtClean="0"/>
+              <a:rPr lang="en-US" altLang="zh-CN" dirty="0" smtClean="0"/>
               <a:t>, </a:t>
             </a:r>
             <a:r>
-              <a:rPr lang="zh-CN" altLang="en-US" sz="2000" dirty="0" smtClean="0"/>
+              <a:rPr lang="zh-CN" altLang="en-US" dirty="0" smtClean="0"/>
               <a:t>避免引起顾客不悦</a:t>
             </a:r>
             <a:r>
-              <a:rPr lang="en-US" altLang="zh-CN" sz="2000" dirty="0" smtClean="0"/>
+              <a:rPr lang="en-US" altLang="zh-CN" dirty="0" smtClean="0"/>
               <a:t>.</a:t>
             </a:r>
           </a:p>
@@ -3238,51 +3262,35 @@
               <a:buAutoNum type="arabicPeriod"/>
             </a:pPr>
             <a:r>
-              <a:rPr lang="zh-CN" altLang="en-US" sz="2000" dirty="0" smtClean="0"/>
-              <a:t>改变</a:t>
-            </a:r>
-            <a:r>
-              <a:rPr lang="zh-CN" altLang="en-US" sz="2000" dirty="0" smtClean="0"/>
-              <a:t>纸质菜单不易更改的弱点</a:t>
-            </a:r>
-            <a:r>
-              <a:rPr lang="en-US" altLang="zh-CN" sz="2000" dirty="0" smtClean="0"/>
+              <a:rPr lang="zh-CN" altLang="en-US" dirty="0" smtClean="0"/>
+              <a:t>改变纸质菜单不易更改的弱点</a:t>
+            </a:r>
+            <a:r>
+              <a:rPr lang="en-US" altLang="zh-CN" dirty="0" smtClean="0"/>
               <a:t>, </a:t>
             </a:r>
             <a:r>
-              <a:rPr lang="zh-CN" altLang="en-US" sz="2000" dirty="0" smtClean="0"/>
-              <a:t>更改一个菜品就会导致整张</a:t>
-            </a:r>
-            <a:r>
-              <a:rPr lang="zh-CN" altLang="en-US" sz="2000" dirty="0" smtClean="0"/>
-              <a:t>纸</a:t>
-            </a:r>
-            <a:r>
-              <a:rPr lang="zh-CN" altLang="en-US" sz="2000" dirty="0" smtClean="0"/>
-              <a:t>质菜</a:t>
-            </a:r>
-            <a:r>
-              <a:rPr lang="zh-CN" altLang="en-US" sz="2000" dirty="0" smtClean="0"/>
-              <a:t>单失效</a:t>
-            </a:r>
-            <a:r>
-              <a:rPr lang="en-US" altLang="zh-CN" sz="2000" dirty="0" smtClean="0"/>
+              <a:rPr lang="zh-CN" altLang="en-US" dirty="0" smtClean="0"/>
+              <a:t>更改一个菜品就会导致整张纸质菜单失效</a:t>
+            </a:r>
+            <a:r>
+              <a:rPr lang="en-US" altLang="zh-CN" dirty="0" smtClean="0"/>
               <a:t>, </a:t>
             </a:r>
             <a:r>
-              <a:rPr lang="zh-CN" altLang="en-US" sz="2000" dirty="0" smtClean="0"/>
+              <a:rPr lang="zh-CN" altLang="en-US" dirty="0" smtClean="0"/>
               <a:t>但是电子化菜单可以随时修改价格</a:t>
             </a:r>
             <a:r>
-              <a:rPr lang="en-US" altLang="zh-CN" sz="2000" dirty="0" smtClean="0"/>
+              <a:rPr lang="en-US" altLang="zh-CN" dirty="0" smtClean="0"/>
               <a:t>, </a:t>
             </a:r>
             <a:r>
-              <a:rPr lang="zh-CN" altLang="en-US" sz="2000" dirty="0" smtClean="0"/>
+              <a:rPr lang="zh-CN" altLang="en-US" dirty="0" smtClean="0"/>
               <a:t>名称等参数</a:t>
             </a:r>
             <a:r>
-              <a:rPr lang="en-US" altLang="zh-CN" sz="2000" dirty="0" smtClean="0"/>
+              <a:rPr lang="en-US" altLang="zh-CN" dirty="0" smtClean="0"/>
               <a:t>.</a:t>
             </a:r>
           </a:p>
@@ -3291,148 +3299,285 @@
               <a:buAutoNum type="arabicPeriod"/>
             </a:pPr>
             <a:r>
-              <a:rPr lang="zh-CN" altLang="en-US" sz="2000" dirty="0" smtClean="0"/>
-              <a:t>可以随时根据餐厅的经营状况设</a:t>
-            </a:r>
-            <a:r>
-              <a:rPr lang="zh-CN" altLang="en-US" sz="2000" dirty="0" smtClean="0"/>
-              <a:t>定</a:t>
-            </a:r>
-            <a:r>
-              <a:rPr lang="en-US" altLang="zh-CN" sz="2000" dirty="0" smtClean="0"/>
+              <a:rPr lang="zh-CN" altLang="en-US" dirty="0" smtClean="0"/>
+              <a:t>可以随时根据餐厅的经营状况设定</a:t>
+            </a:r>
+            <a:r>
+              <a:rPr lang="en-US" altLang="zh-CN" dirty="0" smtClean="0"/>
               <a:t>”</a:t>
             </a:r>
             <a:r>
-              <a:rPr lang="zh-CN" altLang="en-US" sz="2000" dirty="0" smtClean="0"/>
+              <a:rPr lang="zh-CN" altLang="en-US" dirty="0" smtClean="0"/>
               <a:t>新品</a:t>
             </a:r>
             <a:r>
-              <a:rPr lang="en-US" altLang="zh-CN" sz="2000" dirty="0" smtClean="0"/>
-              <a:t>”, </a:t>
-            </a:r>
-            <a:r>
-              <a:rPr lang="en-US" altLang="zh-CN" sz="2000" dirty="0" smtClean="0"/>
-              <a:t>“</a:t>
-            </a:r>
-            <a:r>
-              <a:rPr lang="zh-CN" altLang="en-US" sz="2000" dirty="0" smtClean="0"/>
-              <a:t>畅</a:t>
-            </a:r>
-            <a:r>
-              <a:rPr lang="zh-CN" altLang="en-US" sz="2000" dirty="0" smtClean="0"/>
-              <a:t>销</a:t>
-            </a:r>
-            <a:r>
-              <a:rPr lang="zh-CN" altLang="en-US" sz="2000" dirty="0" smtClean="0"/>
-              <a:t>品</a:t>
-            </a:r>
-            <a:r>
-              <a:rPr lang="en-US" altLang="zh-CN" sz="2000" dirty="0" smtClean="0"/>
+              <a:rPr lang="en-US" altLang="zh-CN" dirty="0" smtClean="0"/>
+              <a:t>”, “</a:t>
+            </a:r>
+            <a:r>
+              <a:rPr lang="zh-CN" altLang="en-US" dirty="0" smtClean="0"/>
+              <a:t>畅销品</a:t>
+            </a:r>
+            <a:r>
+              <a:rPr lang="en-US" altLang="zh-CN" dirty="0" smtClean="0"/>
               <a:t>”</a:t>
             </a:r>
             <a:r>
-              <a:rPr lang="zh-CN" altLang="en-US" sz="2000" dirty="0" smtClean="0"/>
-              <a:t>等不同类型进行促销</a:t>
-            </a:r>
-            <a:r>
-              <a:rPr lang="en-US" altLang="zh-CN" sz="2000" dirty="0" smtClean="0"/>
+              <a:rPr lang="zh-CN" altLang="en-US" dirty="0" smtClean="0"/>
+              <a:t>等不同类型进行促销并改善库存状况</a:t>
+            </a:r>
+            <a:r>
+              <a:rPr lang="en-US" altLang="zh-CN" dirty="0" smtClean="0"/>
               <a:t>.</a:t>
             </a:r>
-            <a:endParaRPr lang="en-US" altLang="zh-CN" sz="2000" dirty="0" smtClean="0"/>
           </a:p>
           <a:p>
             <a:pPr marL="342900" indent="-342900">
               <a:buAutoNum type="arabicPeriod"/>
             </a:pPr>
             <a:r>
-              <a:rPr lang="zh-CN" altLang="en-US" sz="2000" dirty="0" smtClean="0"/>
+              <a:rPr lang="zh-CN" altLang="en-US" dirty="0" smtClean="0"/>
               <a:t>及时发布</a:t>
             </a:r>
             <a:r>
-              <a:rPr lang="en-US" altLang="zh-CN" sz="2000" dirty="0" smtClean="0"/>
+              <a:rPr lang="en-US" altLang="zh-CN" dirty="0" smtClean="0"/>
               <a:t>sold out, </a:t>
             </a:r>
             <a:r>
-              <a:rPr lang="zh-CN" altLang="en-US" sz="2000" dirty="0" smtClean="0"/>
-              <a:t>避</a:t>
-            </a:r>
-            <a:r>
-              <a:rPr lang="zh-CN" altLang="en-US" sz="2000" dirty="0" smtClean="0"/>
-              <a:t>免在顾客点菜后才发现</a:t>
-            </a:r>
-            <a:r>
-              <a:rPr lang="en-US" altLang="zh-CN" sz="2000" dirty="0" smtClean="0"/>
+              <a:rPr lang="zh-CN" altLang="en-US" dirty="0" smtClean="0"/>
+              <a:t>避免在顾客点菜后才发现</a:t>
+            </a:r>
+            <a:r>
+              <a:rPr lang="en-US" altLang="zh-CN" dirty="0" smtClean="0"/>
               <a:t>sold out</a:t>
             </a:r>
             <a:r>
-              <a:rPr lang="zh-CN" altLang="en-US" sz="2000" dirty="0" smtClean="0"/>
+              <a:rPr lang="zh-CN" altLang="en-US" dirty="0" smtClean="0"/>
               <a:t>而产生不悦情绪</a:t>
             </a:r>
             <a:r>
-              <a:rPr lang="en-US" altLang="zh-CN" sz="2000" dirty="0" smtClean="0"/>
+              <a:rPr lang="en-US" altLang="zh-CN" dirty="0" smtClean="0"/>
               <a:t>.</a:t>
             </a:r>
-            <a:endParaRPr lang="en-US" altLang="zh-CN" sz="2000" dirty="0" smtClean="0"/>
           </a:p>
           <a:p>
             <a:pPr marL="342900" indent="-342900">
               <a:buAutoNum type="arabicPeriod"/>
             </a:pPr>
             <a:r>
-              <a:rPr lang="zh-CN" altLang="en-US" sz="2000" dirty="0" smtClean="0"/>
+              <a:rPr lang="zh-CN" altLang="en-US" dirty="0" smtClean="0"/>
               <a:t>订单自动流转至总台和厨房</a:t>
             </a:r>
             <a:r>
-              <a:rPr lang="en-US" altLang="zh-CN" sz="2000" dirty="0" smtClean="0"/>
+              <a:rPr lang="en-US" altLang="zh-CN" dirty="0" smtClean="0"/>
               <a:t>, </a:t>
             </a:r>
             <a:r>
-              <a:rPr lang="zh-CN" altLang="en-US" sz="2000" dirty="0" smtClean="0"/>
+              <a:rPr lang="zh-CN" altLang="en-US" dirty="0" smtClean="0"/>
               <a:t>不需人工递单</a:t>
             </a:r>
             <a:r>
-              <a:rPr lang="en-US" altLang="zh-CN" sz="2000" dirty="0" smtClean="0"/>
+              <a:rPr lang="en-US" altLang="zh-CN" dirty="0" smtClean="0"/>
               <a:t>, </a:t>
             </a:r>
             <a:r>
-              <a:rPr lang="zh-CN" altLang="en-US" sz="2000" dirty="0" smtClean="0"/>
+              <a:rPr lang="zh-CN" altLang="en-US" dirty="0" smtClean="0"/>
               <a:t>不需人工录入</a:t>
             </a:r>
             <a:r>
-              <a:rPr lang="en-US" altLang="zh-CN" sz="2000" dirty="0" smtClean="0"/>
+              <a:rPr lang="en-US" altLang="zh-CN" dirty="0" smtClean="0"/>
               <a:t>, </a:t>
             </a:r>
             <a:r>
-              <a:rPr lang="zh-CN" altLang="en-US" sz="2000" dirty="0" smtClean="0"/>
-              <a:t>减少了人工操作从而减少中间环节的失误</a:t>
-            </a:r>
-            <a:r>
-              <a:rPr lang="en-US" altLang="zh-CN" sz="2000" dirty="0" smtClean="0"/>
+              <a:rPr lang="zh-CN" altLang="en-US" dirty="0" smtClean="0"/>
+              <a:t>减少了人工操作以及中间环节可能触发的失误</a:t>
+            </a:r>
+            <a:r>
+              <a:rPr lang="en-US" altLang="zh-CN" dirty="0" smtClean="0"/>
               <a:t>. </a:t>
             </a:r>
-            <a:endParaRPr lang="en-US" altLang="zh-CN" sz="2000" dirty="0" smtClean="0"/>
-          </a:p>
-          <a:p>
-            <a:pPr marL="342900" indent="-342900">
-              <a:buAutoNum type="arabicPeriod"/>
-            </a:pPr>
-            <a:r>
-              <a:rPr lang="zh-CN" altLang="en-US" sz="2000" dirty="0" smtClean="0"/>
-              <a:t>未来将融入数据统计功能</a:t>
-            </a:r>
-            <a:r>
-              <a:rPr lang="en-US" altLang="zh-CN" sz="2000" dirty="0" smtClean="0"/>
+          </a:p>
+        </p:txBody>
+      </p:sp>
+      <p:sp>
+        <p:nvSpPr>
+          <p:cNvPr id="5" name="TextBox 4"/>
+          <p:cNvSpPr txBox="1"/>
+          <p:nvPr/>
+        </p:nvSpPr>
+        <p:spPr>
+          <a:xfrm>
+            <a:off x="323528" y="4005064"/>
+            <a:ext cx="3168352" cy="2031325"/>
+          </a:xfrm>
+          <a:prstGeom prst="rect">
+            <a:avLst/>
+          </a:prstGeom>
+          <a:noFill/>
+        </p:spPr>
+        <p:txBody>
+          <a:bodyPr wrap="square" rtlCol="0">
+            <a:spAutoFit/>
+          </a:bodyPr>
+          <a:lstStyle/>
+          <a:p>
+            <a:r>
+              <a:rPr lang="en-US" altLang="zh-CN" dirty="0" smtClean="0"/>
+              <a:t>9. </a:t>
+            </a:r>
+            <a:r>
+              <a:rPr lang="zh-CN" altLang="en-US" dirty="0" smtClean="0"/>
+              <a:t>融入数据统计功能</a:t>
+            </a:r>
+            <a:r>
+              <a:rPr lang="en-US" altLang="zh-CN" dirty="0" smtClean="0"/>
               <a:t>, </a:t>
             </a:r>
             <a:r>
-              <a:rPr lang="zh-CN" altLang="en-US" sz="2000" dirty="0" smtClean="0"/>
-              <a:t>更加有助于营销活动</a:t>
-            </a:r>
-            <a:r>
-              <a:rPr lang="en-US" altLang="zh-CN" sz="2000" dirty="0" smtClean="0"/>
+              <a:rPr lang="zh-CN" altLang="en-US" dirty="0" smtClean="0"/>
+              <a:t>通过饼图</a:t>
+            </a:r>
+            <a:r>
+              <a:rPr lang="en-US" altLang="zh-CN" dirty="0" smtClean="0"/>
+              <a:t>,</a:t>
+            </a:r>
+            <a:r>
+              <a:rPr lang="zh-CN" altLang="en-US" dirty="0" smtClean="0"/>
+              <a:t>柱状图</a:t>
+            </a:r>
+            <a:r>
+              <a:rPr lang="en-US" altLang="zh-CN" dirty="0" smtClean="0"/>
+              <a:t>,</a:t>
+            </a:r>
+            <a:r>
+              <a:rPr lang="zh-CN" altLang="en-US" dirty="0" smtClean="0"/>
+              <a:t>线形图等多种方式展现企业运营数据</a:t>
+            </a:r>
+            <a:r>
+              <a:rPr lang="en-US" altLang="zh-CN" dirty="0" smtClean="0"/>
+              <a:t>, </a:t>
+            </a:r>
+            <a:r>
+              <a:rPr lang="zh-CN" altLang="en-US" dirty="0" smtClean="0"/>
+              <a:t>更加有助于营销活动和经营管理</a:t>
+            </a:r>
+            <a:r>
+              <a:rPr lang="en-US" altLang="zh-CN" dirty="0" smtClean="0"/>
               <a:t>.</a:t>
             </a:r>
-            <a:endParaRPr lang="zh-CN" altLang="en-US" sz="2000" dirty="0"/>
+          </a:p>
+          <a:p>
+            <a:r>
+              <a:rPr lang="en-US" altLang="zh-CN" dirty="0" smtClean="0"/>
+              <a:t>10. </a:t>
+            </a:r>
+            <a:r>
+              <a:rPr lang="zh-CN" altLang="en-US" dirty="0" smtClean="0"/>
+              <a:t>支持多语言切换</a:t>
+            </a:r>
+            <a:r>
+              <a:rPr lang="en-US" altLang="zh-CN" dirty="0" smtClean="0"/>
+              <a:t>, </a:t>
+            </a:r>
+            <a:r>
+              <a:rPr lang="zh-CN" altLang="en-US" dirty="0" smtClean="0"/>
+              <a:t>方便服务于各个国家的客户</a:t>
+            </a:r>
+            <a:r>
+              <a:rPr lang="en-US" altLang="zh-CN" dirty="0" smtClean="0"/>
+              <a:t>.</a:t>
+            </a:r>
+            <a:endParaRPr lang="zh-CN" altLang="en-US" dirty="0" smtClean="0"/>
+          </a:p>
+          <a:p>
+            <a:endParaRPr lang="zh-CN" altLang="en-US" dirty="0"/>
+          </a:p>
+        </p:txBody>
+      </p:sp>
+    </p:spTree>
+  </p:cSld>
+  <p:clrMapOvr>
+    <a:masterClrMapping/>
+  </p:clrMapOvr>
+</p:sld>
+</file>
+
+<file path=ppt/slides/slide2.xml><?xml version="1.0" encoding="utf-8"?>
+<p:sld xmlns:a="http://schemas.openxmlformats.org/drawingml/2006/main" xmlns:r="http://schemas.openxmlformats.org/officeDocument/2006/relationships" xmlns:p="http://schemas.openxmlformats.org/presentationml/2006/main">
+  <p:cSld>
+    <p:spTree>
+      <p:nvGrpSpPr>
+        <p:cNvPr id="1" name=""/>
+        <p:cNvGrpSpPr/>
+        <p:nvPr/>
+      </p:nvGrpSpPr>
+      <p:grpSpPr>
+        <a:xfrm>
+          <a:off x="0" y="0"/>
+          <a:ext cx="0" cy="0"/>
+          <a:chOff x="0" y="0"/>
+          <a:chExt cx="0" cy="0"/>
+        </a:xfrm>
+      </p:grpSpPr>
+      <p:pic>
+        <p:nvPicPr>
+          <p:cNvPr id="7" name="图片 6" descr="introduce.png"/>
+          <p:cNvPicPr>
+            <a:picLocks noChangeAspect="1"/>
+          </p:cNvPicPr>
+          <p:nvPr/>
+        </p:nvPicPr>
+        <p:blipFill>
+          <a:blip r:embed="rId2" cstate="print"/>
+          <a:stretch>
+            <a:fillRect/>
+          </a:stretch>
+        </p:blipFill>
+        <p:spPr>
+          <a:xfrm>
+            <a:off x="0" y="116632"/>
+            <a:ext cx="9144000" cy="5195617"/>
+          </a:xfrm>
+          <a:prstGeom prst="rect">
+            <a:avLst/>
+          </a:prstGeom>
+        </p:spPr>
+      </p:pic>
+      <p:sp>
+        <p:nvSpPr>
+          <p:cNvPr id="8" name="TextBox 7"/>
+          <p:cNvSpPr txBox="1"/>
+          <p:nvPr/>
+        </p:nvSpPr>
+        <p:spPr>
+          <a:xfrm>
+            <a:off x="251520" y="5445224"/>
+            <a:ext cx="8640960" cy="646331"/>
+          </a:xfrm>
+          <a:prstGeom prst="rect">
+            <a:avLst/>
+          </a:prstGeom>
+          <a:noFill/>
+        </p:spPr>
+        <p:txBody>
+          <a:bodyPr wrap="square" rtlCol="0">
+            <a:spAutoFit/>
+          </a:bodyPr>
+          <a:lstStyle/>
+          <a:p>
+            <a:r>
+              <a:rPr lang="zh-CN" altLang="en-US" dirty="0" smtClean="0"/>
+              <a:t>主要特色</a:t>
+            </a:r>
+            <a:r>
+              <a:rPr lang="en-US" altLang="zh-CN" dirty="0" smtClean="0"/>
+              <a:t>: </a:t>
+            </a:r>
+            <a:r>
+              <a:rPr lang="zh-CN" altLang="en-US" dirty="0" smtClean="0"/>
+              <a:t>菜单结构、价格、图片等内容可动态调整。多语言支持。 下单数据实时传输至厨房，减少中间环节；厨房数据也可以实时传输至客户手中，如售罄、促销等。</a:t>
+            </a:r>
+            <a:endParaRPr lang="zh-CN" altLang="en-US" dirty="0"/>
           </a:p>
         </p:txBody>
       </p:sp>

</xml_diff>